<commit_message>
Made graphs and figures better
</commit_message>
<xml_diff>
--- a/R1 graphs.pptx
+++ b/R1 graphs.pptx
@@ -520,7 +520,9 @@
         <c:spPr>
           <a:noFill/>
           <a:ln>
-            <a:noFill/>
+            <a:solidFill>
+              <a:sysClr val="windowText" lastClr="000000"/>
+            </a:solidFill>
           </a:ln>
           <a:effectLst/>
         </c:spPr>
@@ -997,7 +999,9 @@
         <c:spPr>
           <a:noFill/>
           <a:ln>
-            <a:noFill/>
+            <a:solidFill>
+              <a:sysClr val="windowText" lastClr="000000"/>
+            </a:solidFill>
           </a:ln>
           <a:effectLst/>
         </c:spPr>
@@ -1473,7 +1477,9 @@
         <c:spPr>
           <a:noFill/>
           <a:ln>
-            <a:noFill/>
+            <a:solidFill>
+              <a:sysClr val="windowText" lastClr="000000"/>
+            </a:solidFill>
           </a:ln>
           <a:effectLst/>
         </c:spPr>
@@ -3318,7 +3324,7 @@
           <a:p>
             <a:fld id="{DB2FEE4C-ED7D-4FF0-A057-637F7855F7F6}" type="datetimeFigureOut">
               <a:rPr lang="en-US" smtClean="0"/>
-              <a:t>6/2/2020</a:t>
+              <a:t>6/3/2020</a:t>
             </a:fld>
             <a:endParaRPr lang="en-US"/>
           </a:p>
@@ -3516,7 +3522,7 @@
           <a:p>
             <a:fld id="{DB2FEE4C-ED7D-4FF0-A057-637F7855F7F6}" type="datetimeFigureOut">
               <a:rPr lang="en-US" smtClean="0"/>
-              <a:t>6/2/2020</a:t>
+              <a:t>6/3/2020</a:t>
             </a:fld>
             <a:endParaRPr lang="en-US"/>
           </a:p>
@@ -3724,7 +3730,7 @@
           <a:p>
             <a:fld id="{DB2FEE4C-ED7D-4FF0-A057-637F7855F7F6}" type="datetimeFigureOut">
               <a:rPr lang="en-US" smtClean="0"/>
-              <a:t>6/2/2020</a:t>
+              <a:t>6/3/2020</a:t>
             </a:fld>
             <a:endParaRPr lang="en-US"/>
           </a:p>
@@ -3922,7 +3928,7 @@
           <a:p>
             <a:fld id="{DB2FEE4C-ED7D-4FF0-A057-637F7855F7F6}" type="datetimeFigureOut">
               <a:rPr lang="en-US" smtClean="0"/>
-              <a:t>6/2/2020</a:t>
+              <a:t>6/3/2020</a:t>
             </a:fld>
             <a:endParaRPr lang="en-US"/>
           </a:p>
@@ -4197,7 +4203,7 @@
           <a:p>
             <a:fld id="{DB2FEE4C-ED7D-4FF0-A057-637F7855F7F6}" type="datetimeFigureOut">
               <a:rPr lang="en-US" smtClean="0"/>
-              <a:t>6/2/2020</a:t>
+              <a:t>6/3/2020</a:t>
             </a:fld>
             <a:endParaRPr lang="en-US"/>
           </a:p>
@@ -4462,7 +4468,7 @@
           <a:p>
             <a:fld id="{DB2FEE4C-ED7D-4FF0-A057-637F7855F7F6}" type="datetimeFigureOut">
               <a:rPr lang="en-US" smtClean="0"/>
-              <a:t>6/2/2020</a:t>
+              <a:t>6/3/2020</a:t>
             </a:fld>
             <a:endParaRPr lang="en-US"/>
           </a:p>
@@ -4874,7 +4880,7 @@
           <a:p>
             <a:fld id="{DB2FEE4C-ED7D-4FF0-A057-637F7855F7F6}" type="datetimeFigureOut">
               <a:rPr lang="en-US" smtClean="0"/>
-              <a:t>6/2/2020</a:t>
+              <a:t>6/3/2020</a:t>
             </a:fld>
             <a:endParaRPr lang="en-US"/>
           </a:p>
@@ -5015,7 +5021,7 @@
           <a:p>
             <a:fld id="{DB2FEE4C-ED7D-4FF0-A057-637F7855F7F6}" type="datetimeFigureOut">
               <a:rPr lang="en-US" smtClean="0"/>
-              <a:t>6/2/2020</a:t>
+              <a:t>6/3/2020</a:t>
             </a:fld>
             <a:endParaRPr lang="en-US"/>
           </a:p>
@@ -5128,7 +5134,7 @@
           <a:p>
             <a:fld id="{DB2FEE4C-ED7D-4FF0-A057-637F7855F7F6}" type="datetimeFigureOut">
               <a:rPr lang="en-US" smtClean="0"/>
-              <a:t>6/2/2020</a:t>
+              <a:t>6/3/2020</a:t>
             </a:fld>
             <a:endParaRPr lang="en-US"/>
           </a:p>
@@ -5439,7 +5445,7 @@
           <a:p>
             <a:fld id="{DB2FEE4C-ED7D-4FF0-A057-637F7855F7F6}" type="datetimeFigureOut">
               <a:rPr lang="en-US" smtClean="0"/>
-              <a:t>6/2/2020</a:t>
+              <a:t>6/3/2020</a:t>
             </a:fld>
             <a:endParaRPr lang="en-US"/>
           </a:p>
@@ -5727,7 +5733,7 @@
           <a:p>
             <a:fld id="{DB2FEE4C-ED7D-4FF0-A057-637F7855F7F6}" type="datetimeFigureOut">
               <a:rPr lang="en-US" smtClean="0"/>
-              <a:t>6/2/2020</a:t>
+              <a:t>6/3/2020</a:t>
             </a:fld>
             <a:endParaRPr lang="en-US"/>
           </a:p>
@@ -5968,7 +5974,7 @@
           <a:p>
             <a:fld id="{DB2FEE4C-ED7D-4FF0-A057-637F7855F7F6}" type="datetimeFigureOut">
               <a:rPr lang="en-US" smtClean="0"/>
-              <a:t>6/2/2020</a:t>
+              <a:t>6/3/2020</a:t>
             </a:fld>
             <a:endParaRPr lang="en-US"/>
           </a:p>
@@ -6400,7 +6406,7 @@
           <p:nvPr>
             <p:extLst>
               <p:ext uri="{D42A27DB-BD31-4B8C-83A1-F6EECF244321}">
-                <p14:modId xmlns:p14="http://schemas.microsoft.com/office/powerpoint/2010/main" val="1123198449"/>
+                <p14:modId xmlns:p14="http://schemas.microsoft.com/office/powerpoint/2010/main" val="1336388261"/>
               </p:ext>
             </p:extLst>
           </p:nvPr>
@@ -6430,7 +6436,7 @@
           <p:nvPr>
             <p:extLst>
               <p:ext uri="{D42A27DB-BD31-4B8C-83A1-F6EECF244321}">
-                <p14:modId xmlns:p14="http://schemas.microsoft.com/office/powerpoint/2010/main" val="4157915338"/>
+                <p14:modId xmlns:p14="http://schemas.microsoft.com/office/powerpoint/2010/main" val="2896801143"/>
               </p:ext>
             </p:extLst>
           </p:nvPr>
@@ -6460,7 +6466,7 @@
           <p:nvPr>
             <p:extLst>
               <p:ext uri="{D42A27DB-BD31-4B8C-83A1-F6EECF244321}">
-                <p14:modId xmlns:p14="http://schemas.microsoft.com/office/powerpoint/2010/main" val="3019541481"/>
+                <p14:modId xmlns:p14="http://schemas.microsoft.com/office/powerpoint/2010/main" val="1834109656"/>
               </p:ext>
             </p:extLst>
           </p:nvPr>

</xml_diff>